<commit_message>
Deploying to gh-pages from @ tpaknok/EcoCoMix@86f4902d74211069444f5e2e1835a13b7acddd6e 🚀
</commit_message>
<xml_diff>
--- a/reference/figures/Logo.pptx
+++ b/reference/figures/Logo.pptx
@@ -153,6 +153,38 @@
         </pc:grpChg>
         <pc:picChg chg="mod topLvl">
           <ac:chgData name="Toby Tsang" userId="e597de51-a393-472f-96bf-05139d3f58b1" providerId="ADAL" clId="{3AA9168F-D3C4-40B7-A024-8272BB34E8E6}" dt="2025-01-15T19:19:19.154" v="12" actId="165"/>
+          <ac:picMkLst>
+            <pc:docMk/>
+            <pc:sldMk cId="743475299" sldId="256"/>
+            <ac:picMk id="5" creationId="{2B7452F8-2ADD-8F24-E748-48AD69F963E1}"/>
+          </ac:picMkLst>
+        </pc:picChg>
+      </pc:sldChg>
+    </pc:docChg>
+  </pc:docChgLst>
+  <pc:docChgLst>
+    <pc:chgData name="Toby Tsang" userId="e597de51-a393-472f-96bf-05139d3f58b1" providerId="ADAL" clId="{4908D953-FD89-4161-B6E0-5FB59F528749}"/>
+    <pc:docChg chg="undo redo custSel modSld">
+      <pc:chgData name="Toby Tsang" userId="e597de51-a393-472f-96bf-05139d3f58b1" providerId="ADAL" clId="{4908D953-FD89-4161-B6E0-5FB59F528749}" dt="2025-01-15T19:42:45.543" v="25" actId="1035"/>
+      <pc:docMkLst>
+        <pc:docMk/>
+      </pc:docMkLst>
+      <pc:sldChg chg="modSp mod">
+        <pc:chgData name="Toby Tsang" userId="e597de51-a393-472f-96bf-05139d3f58b1" providerId="ADAL" clId="{4908D953-FD89-4161-B6E0-5FB59F528749}" dt="2025-01-15T19:42:45.543" v="25" actId="1035"/>
+        <pc:sldMkLst>
+          <pc:docMk/>
+          <pc:sldMk cId="743475299" sldId="256"/>
+        </pc:sldMkLst>
+        <pc:spChg chg="mod">
+          <ac:chgData name="Toby Tsang" userId="e597de51-a393-472f-96bf-05139d3f58b1" providerId="ADAL" clId="{4908D953-FD89-4161-B6E0-5FB59F528749}" dt="2025-01-15T19:42:45.543" v="25" actId="1035"/>
+          <ac:spMkLst>
+            <pc:docMk/>
+            <pc:sldMk cId="743475299" sldId="256"/>
+            <ac:spMk id="6" creationId="{49DA4BB5-1C54-8A8A-3BE8-21C59C18EB33}"/>
+          </ac:spMkLst>
+        </pc:spChg>
+        <pc:picChg chg="mod">
+          <ac:chgData name="Toby Tsang" userId="e597de51-a393-472f-96bf-05139d3f58b1" providerId="ADAL" clId="{4908D953-FD89-4161-B6E0-5FB59F528749}" dt="2025-01-15T19:38:30.265" v="18" actId="1076"/>
           <ac:picMkLst>
             <pc:docMk/>
             <pc:sldMk cId="743475299" sldId="256"/>
@@ -3045,8 +3077,8 @@
         </p:nvSpPr>
         <p:spPr>
           <a:xfrm rot="5400000">
-            <a:off x="131400" y="116394"/>
-            <a:ext cx="1566000" cy="1348362"/>
+            <a:off x="146776" y="130495"/>
+            <a:ext cx="1535245" cy="1321882"/>
           </a:xfrm>
           <a:prstGeom prst="hexagon">
             <a:avLst/>
@@ -3057,7 +3089,7 @@
               <a:lumOff val="60000"/>
             </a:schemeClr>
           </a:solidFill>
-          <a:ln>
+          <a:ln w="38100">
             <a:solidFill>
               <a:schemeClr val="tx1"/>
             </a:solidFill>

</xml_diff>

<commit_message>
Deploying to gh-pages from @ tpaknok/EcoCoMix@bad173bae9c3c7aa6b3a7a84666bf41a0cfe9659 🚀
</commit_message>
<xml_diff>
--- a/reference/figures/Logo.pptx
+++ b/reference/figures/Logo.pptx
@@ -165,18 +165,18 @@
   <pc:docChgLst>
     <pc:chgData name="Toby Tsang" userId="e597de51-a393-472f-96bf-05139d3f58b1" providerId="ADAL" clId="{4908D953-FD89-4161-B6E0-5FB59F528749}"/>
     <pc:docChg chg="undo redo custSel modSld">
-      <pc:chgData name="Toby Tsang" userId="e597de51-a393-472f-96bf-05139d3f58b1" providerId="ADAL" clId="{4908D953-FD89-4161-B6E0-5FB59F528749}" dt="2025-01-15T19:42:45.543" v="25" actId="1035"/>
+      <pc:chgData name="Toby Tsang" userId="e597de51-a393-472f-96bf-05139d3f58b1" providerId="ADAL" clId="{4908D953-FD89-4161-B6E0-5FB59F528749}" dt="2025-01-15T19:45:11.156" v="28" actId="1076"/>
       <pc:docMkLst>
         <pc:docMk/>
       </pc:docMkLst>
       <pc:sldChg chg="modSp mod">
-        <pc:chgData name="Toby Tsang" userId="e597de51-a393-472f-96bf-05139d3f58b1" providerId="ADAL" clId="{4908D953-FD89-4161-B6E0-5FB59F528749}" dt="2025-01-15T19:42:45.543" v="25" actId="1035"/>
+        <pc:chgData name="Toby Tsang" userId="e597de51-a393-472f-96bf-05139d3f58b1" providerId="ADAL" clId="{4908D953-FD89-4161-B6E0-5FB59F528749}" dt="2025-01-15T19:45:11.156" v="28" actId="1076"/>
         <pc:sldMkLst>
           <pc:docMk/>
           <pc:sldMk cId="743475299" sldId="256"/>
         </pc:sldMkLst>
         <pc:spChg chg="mod">
-          <ac:chgData name="Toby Tsang" userId="e597de51-a393-472f-96bf-05139d3f58b1" providerId="ADAL" clId="{4908D953-FD89-4161-B6E0-5FB59F528749}" dt="2025-01-15T19:42:45.543" v="25" actId="1035"/>
+          <ac:chgData name="Toby Tsang" userId="e597de51-a393-472f-96bf-05139d3f58b1" providerId="ADAL" clId="{4908D953-FD89-4161-B6E0-5FB59F528749}" dt="2025-01-15T19:45:05.048" v="26" actId="1582"/>
           <ac:spMkLst>
             <pc:docMk/>
             <pc:sldMk cId="743475299" sldId="256"/>
@@ -184,7 +184,7 @@
           </ac:spMkLst>
         </pc:spChg>
         <pc:picChg chg="mod">
-          <ac:chgData name="Toby Tsang" userId="e597de51-a393-472f-96bf-05139d3f58b1" providerId="ADAL" clId="{4908D953-FD89-4161-B6E0-5FB59F528749}" dt="2025-01-15T19:38:30.265" v="18" actId="1076"/>
+          <ac:chgData name="Toby Tsang" userId="e597de51-a393-472f-96bf-05139d3f58b1" providerId="ADAL" clId="{4908D953-FD89-4161-B6E0-5FB59F528749}" dt="2025-01-15T19:45:11.156" v="28" actId="1076"/>
           <ac:picMkLst>
             <pc:docMk/>
             <pc:sldMk cId="743475299" sldId="256"/>
@@ -3089,7 +3089,7 @@
               <a:lumOff val="60000"/>
             </a:schemeClr>
           </a:solidFill>
-          <a:ln w="38100">
+          <a:ln w="28575">
             <a:solidFill>
               <a:schemeClr val="tx1"/>
             </a:solidFill>
@@ -3148,8 +3148,8 @@
         </p:blipFill>
         <p:spPr>
           <a:xfrm>
-            <a:off x="191690" y="44053"/>
-            <a:ext cx="1445419" cy="1445419"/>
+            <a:off x="213717" y="72629"/>
+            <a:ext cx="1401366" cy="1401366"/>
           </a:xfrm>
           <a:prstGeom prst="rect">
             <a:avLst/>

</xml_diff>

<commit_message>
Deploying to gh-pages from @ tpaknok/EcoCoMix@b08a021915a8bf8073b44c3e25c3b673dad5b340 🚀
</commit_message>
<xml_diff>
--- a/reference/figures/Logo.pptx
+++ b/reference/figures/Logo.pptx
@@ -116,6 +116,7 @@
 <p1510:revInfo xmlns:a="http://schemas.openxmlformats.org/drawingml/2006/main" xmlns:r="http://schemas.openxmlformats.org/officeDocument/2006/relationships" xmlns:p1510="http://schemas.microsoft.com/office/powerpoint/2015/10/main">
   <p1510:revLst>
     <p1510:client id="{3AA9168F-D3C4-40B7-A024-8272BB34E8E6}" v="2" dt="2025-01-15T19:19:19.155"/>
+    <p1510:client id="{4908D953-FD89-4161-B6E0-5FB59F528749}" v="1" dt="2025-01-15T19:47:32.268"/>
   </p1510:revLst>
 </p1510:revInfo>
 </file>
@@ -165,26 +166,34 @@
   <pc:docChgLst>
     <pc:chgData name="Toby Tsang" userId="e597de51-a393-472f-96bf-05139d3f58b1" providerId="ADAL" clId="{4908D953-FD89-4161-B6E0-5FB59F528749}"/>
     <pc:docChg chg="undo redo custSel modSld">
-      <pc:chgData name="Toby Tsang" userId="e597de51-a393-472f-96bf-05139d3f58b1" providerId="ADAL" clId="{4908D953-FD89-4161-B6E0-5FB59F528749}" dt="2025-01-15T19:45:11.156" v="28" actId="1076"/>
+      <pc:chgData name="Toby Tsang" userId="e597de51-a393-472f-96bf-05139d3f58b1" providerId="ADAL" clId="{4908D953-FD89-4161-B6E0-5FB59F528749}" dt="2025-01-15T19:47:32.267" v="29" actId="164"/>
       <pc:docMkLst>
         <pc:docMk/>
       </pc:docMkLst>
-      <pc:sldChg chg="modSp mod">
-        <pc:chgData name="Toby Tsang" userId="e597de51-a393-472f-96bf-05139d3f58b1" providerId="ADAL" clId="{4908D953-FD89-4161-B6E0-5FB59F528749}" dt="2025-01-15T19:45:11.156" v="28" actId="1076"/>
+      <pc:sldChg chg="addSp modSp mod">
+        <pc:chgData name="Toby Tsang" userId="e597de51-a393-472f-96bf-05139d3f58b1" providerId="ADAL" clId="{4908D953-FD89-4161-B6E0-5FB59F528749}" dt="2025-01-15T19:47:32.267" v="29" actId="164"/>
         <pc:sldMkLst>
           <pc:docMk/>
           <pc:sldMk cId="743475299" sldId="256"/>
         </pc:sldMkLst>
         <pc:spChg chg="mod">
-          <ac:chgData name="Toby Tsang" userId="e597de51-a393-472f-96bf-05139d3f58b1" providerId="ADAL" clId="{4908D953-FD89-4161-B6E0-5FB59F528749}" dt="2025-01-15T19:45:05.048" v="26" actId="1582"/>
+          <ac:chgData name="Toby Tsang" userId="e597de51-a393-472f-96bf-05139d3f58b1" providerId="ADAL" clId="{4908D953-FD89-4161-B6E0-5FB59F528749}" dt="2025-01-15T19:47:32.267" v="29" actId="164"/>
           <ac:spMkLst>
             <pc:docMk/>
             <pc:sldMk cId="743475299" sldId="256"/>
             <ac:spMk id="6" creationId="{49DA4BB5-1C54-8A8A-3BE8-21C59C18EB33}"/>
           </ac:spMkLst>
         </pc:spChg>
+        <pc:grpChg chg="add mod">
+          <ac:chgData name="Toby Tsang" userId="e597de51-a393-472f-96bf-05139d3f58b1" providerId="ADAL" clId="{4908D953-FD89-4161-B6E0-5FB59F528749}" dt="2025-01-15T19:47:32.267" v="29" actId="164"/>
+          <ac:grpSpMkLst>
+            <pc:docMk/>
+            <pc:sldMk cId="743475299" sldId="256"/>
+            <ac:grpSpMk id="2" creationId="{CBC7A0A9-3454-7904-E502-0FD38F089E0E}"/>
+          </ac:grpSpMkLst>
+        </pc:grpChg>
         <pc:picChg chg="mod">
-          <ac:chgData name="Toby Tsang" userId="e597de51-a393-472f-96bf-05139d3f58b1" providerId="ADAL" clId="{4908D953-FD89-4161-B6E0-5FB59F528749}" dt="2025-01-15T19:45:11.156" v="28" actId="1076"/>
+          <ac:chgData name="Toby Tsang" userId="e597de51-a393-472f-96bf-05139d3f58b1" providerId="ADAL" clId="{4908D953-FD89-4161-B6E0-5FB59F528749}" dt="2025-01-15T19:47:32.267" v="29" actId="164"/>
           <ac:picMkLst>
             <pc:docMk/>
             <pc:sldMk cId="743475299" sldId="256"/>
@@ -3063,99 +3072,120 @@
           <a:chExt cx="0" cy="0"/>
         </a:xfrm>
       </p:grpSpPr>
-      <p:sp>
-        <p:nvSpPr>
-          <p:cNvPr id="6" name="Hexagon 5">
+      <p:grpSp>
+        <p:nvGrpSpPr>
+          <p:cNvPr id="2" name="Group 1">
             <a:extLst>
               <a:ext uri="{FF2B5EF4-FFF2-40B4-BE49-F238E27FC236}">
-                <a16:creationId xmlns:a16="http://schemas.microsoft.com/office/drawing/2014/main" id="{49DA4BB5-1C54-8A8A-3BE8-21C59C18EB33}"/>
+                <a16:creationId xmlns:a16="http://schemas.microsoft.com/office/drawing/2014/main" id="{CBC7A0A9-3454-7904-E502-0FD38F089E0E}"/>
               </a:ext>
             </a:extLst>
           </p:cNvPr>
-          <p:cNvSpPr/>
+          <p:cNvGrpSpPr/>
           <p:nvPr/>
-        </p:nvSpPr>
-        <p:spPr>
-          <a:xfrm rot="5400000">
-            <a:off x="146776" y="130495"/>
-            <a:ext cx="1535245" cy="1321882"/>
+        </p:nvGrpSpPr>
+        <p:grpSpPr>
+          <a:xfrm>
+            <a:off x="213717" y="23813"/>
+            <a:ext cx="1401366" cy="1535245"/>
+            <a:chOff x="213717" y="23813"/>
+            <a:chExt cx="1401366" cy="1535245"/>
           </a:xfrm>
-          <a:prstGeom prst="hexagon">
-            <a:avLst/>
-          </a:prstGeom>
-          <a:solidFill>
-            <a:schemeClr val="accent2">
-              <a:lumMod val="40000"/>
-              <a:lumOff val="60000"/>
-            </a:schemeClr>
-          </a:solidFill>
-          <a:ln w="28575">
+        </p:grpSpPr>
+        <p:sp>
+          <p:nvSpPr>
+            <p:cNvPr id="6" name="Hexagon 5">
+              <a:extLst>
+                <a:ext uri="{FF2B5EF4-FFF2-40B4-BE49-F238E27FC236}">
+                  <a16:creationId xmlns:a16="http://schemas.microsoft.com/office/drawing/2014/main" id="{49DA4BB5-1C54-8A8A-3BE8-21C59C18EB33}"/>
+                </a:ext>
+              </a:extLst>
+            </p:cNvPr>
+            <p:cNvSpPr/>
+            <p:nvPr/>
+          </p:nvSpPr>
+          <p:spPr>
+            <a:xfrm rot="5400000">
+              <a:off x="146776" y="130495"/>
+              <a:ext cx="1535245" cy="1321882"/>
+            </a:xfrm>
+            <a:prstGeom prst="hexagon">
+              <a:avLst/>
+            </a:prstGeom>
             <a:solidFill>
-              <a:schemeClr val="tx1"/>
+              <a:schemeClr val="accent2">
+                <a:lumMod val="40000"/>
+                <a:lumOff val="60000"/>
+              </a:schemeClr>
             </a:solidFill>
-          </a:ln>
-        </p:spPr>
-        <p:style>
-          <a:lnRef idx="2">
-            <a:schemeClr val="accent1">
-              <a:shade val="15000"/>
-            </a:schemeClr>
-          </a:lnRef>
-          <a:fillRef idx="1">
-            <a:schemeClr val="accent1"/>
-          </a:fillRef>
-          <a:effectRef idx="0">
-            <a:schemeClr val="accent1"/>
-          </a:effectRef>
-          <a:fontRef idx="minor">
-            <a:schemeClr val="lt1"/>
-          </a:fontRef>
-        </p:style>
-        <p:txBody>
-          <a:bodyPr rtlCol="0" anchor="ctr"/>
-          <a:lstStyle/>
-          <a:p>
-            <a:pPr algn="ctr"/>
-            <a:endParaRPr lang="en-CA" dirty="0"/>
-          </a:p>
-        </p:txBody>
-      </p:sp>
-      <p:pic>
-        <p:nvPicPr>
-          <p:cNvPr id="5" name="Picture 4" descr="A colorful explosion with text&#10;&#10;AI-generated content may be incorrect.">
-            <a:extLst>
-              <a:ext uri="{FF2B5EF4-FFF2-40B4-BE49-F238E27FC236}">
-                <a16:creationId xmlns:a16="http://schemas.microsoft.com/office/drawing/2014/main" id="{2B7452F8-2ADD-8F24-E748-48AD69F963E1}"/>
-              </a:ext>
-            </a:extLst>
-          </p:cNvPr>
-          <p:cNvPicPr>
-            <a:picLocks noChangeAspect="1"/>
-          </p:cNvPicPr>
-          <p:nvPr/>
-        </p:nvPicPr>
-        <p:blipFill>
-          <a:blip r:embed="rId2">
-            <a:extLst>
-              <a:ext uri="{28A0092B-C50C-407E-A947-70E740481C1C}">
-                <a14:useLocalDpi xmlns:a14="http://schemas.microsoft.com/office/drawing/2010/main" val="0"/>
-              </a:ext>
-            </a:extLst>
-          </a:blip>
-          <a:stretch>
-            <a:fillRect/>
-          </a:stretch>
-        </p:blipFill>
-        <p:spPr>
-          <a:xfrm>
-            <a:off x="213717" y="72629"/>
-            <a:ext cx="1401366" cy="1401366"/>
-          </a:xfrm>
-          <a:prstGeom prst="rect">
-            <a:avLst/>
-          </a:prstGeom>
-        </p:spPr>
-      </p:pic>
+            <a:ln w="28575">
+              <a:solidFill>
+                <a:schemeClr val="tx1"/>
+              </a:solidFill>
+            </a:ln>
+          </p:spPr>
+          <p:style>
+            <a:lnRef idx="2">
+              <a:schemeClr val="accent1">
+                <a:shade val="15000"/>
+              </a:schemeClr>
+            </a:lnRef>
+            <a:fillRef idx="1">
+              <a:schemeClr val="accent1"/>
+            </a:fillRef>
+            <a:effectRef idx="0">
+              <a:schemeClr val="accent1"/>
+            </a:effectRef>
+            <a:fontRef idx="minor">
+              <a:schemeClr val="lt1"/>
+            </a:fontRef>
+          </p:style>
+          <p:txBody>
+            <a:bodyPr rtlCol="0" anchor="ctr"/>
+            <a:lstStyle/>
+            <a:p>
+              <a:pPr algn="ctr"/>
+              <a:endParaRPr lang="en-CA" dirty="0"/>
+            </a:p>
+          </p:txBody>
+        </p:sp>
+        <p:pic>
+          <p:nvPicPr>
+            <p:cNvPr id="5" name="Picture 4" descr="A colorful explosion with text&#10;&#10;AI-generated content may be incorrect.">
+              <a:extLst>
+                <a:ext uri="{FF2B5EF4-FFF2-40B4-BE49-F238E27FC236}">
+                  <a16:creationId xmlns:a16="http://schemas.microsoft.com/office/drawing/2014/main" id="{2B7452F8-2ADD-8F24-E748-48AD69F963E1}"/>
+                </a:ext>
+              </a:extLst>
+            </p:cNvPr>
+            <p:cNvPicPr>
+              <a:picLocks noChangeAspect="1"/>
+            </p:cNvPicPr>
+            <p:nvPr/>
+          </p:nvPicPr>
+          <p:blipFill>
+            <a:blip r:embed="rId2">
+              <a:extLst>
+                <a:ext uri="{28A0092B-C50C-407E-A947-70E740481C1C}">
+                  <a14:useLocalDpi xmlns:a14="http://schemas.microsoft.com/office/drawing/2010/main" val="0"/>
+                </a:ext>
+              </a:extLst>
+            </a:blip>
+            <a:stretch>
+              <a:fillRect/>
+            </a:stretch>
+          </p:blipFill>
+          <p:spPr>
+            <a:xfrm>
+              <a:off x="213717" y="72629"/>
+              <a:ext cx="1401366" cy="1401366"/>
+            </a:xfrm>
+            <a:prstGeom prst="rect">
+              <a:avLst/>
+            </a:prstGeom>
+          </p:spPr>
+        </p:pic>
+      </p:grpSp>
     </p:spTree>
     <p:extLst>
       <p:ext uri="{BB962C8B-B14F-4D97-AF65-F5344CB8AC3E}">

</xml_diff>